<commit_message>
Update Minor Project Presentation.pptx
</commit_message>
<xml_diff>
--- a/MinorProject/Minor Project Presentation.pptx
+++ b/MinorProject/Minor Project Presentation.pptx
@@ -6099,31 +6099,27 @@
           </a:bodyPr>
           <a:lstStyle/>
           <a:p>
-            <a:pPr marL="0" indent="0">
-              <a:buNone/>
-            </a:pPr>
+            <a:pPr algn="just"/>
             <a:r>
               <a:rPr lang="en-US" sz="1500" dirty="0">
                 <a:latin typeface="Times New Roman" panose="02020603050405020304" pitchFamily="18" charset="0"/>
                 <a:cs typeface="Times New Roman" panose="02020603050405020304" pitchFamily="18" charset="0"/>
               </a:rPr>
-              <a:t>• The aim of the "Expense Tracker" is to empower its target users with enhanced financial visibility and control. </a:t>
-            </a:r>
-          </a:p>
-          <a:p>
-            <a:pPr marL="0" indent="0">
-              <a:buNone/>
-            </a:pPr>
+              <a:t>The aim of the "Expense Tracker" is to empower its target users with enhanced financial visibility and control. </a:t>
+            </a:r>
+          </a:p>
+          <a:p>
+            <a:pPr algn="just"/>
             <a:r>
               <a:rPr lang="en-US" sz="1500" dirty="0">
                 <a:latin typeface="Times New Roman" panose="02020603050405020304" pitchFamily="18" charset="0"/>
                 <a:cs typeface="Times New Roman" panose="02020603050405020304" pitchFamily="18" charset="0"/>
               </a:rPr>
-              <a:t>• Provide functionality for predefined and custom expense categories, allowing users to efficiently classify their spending. </a:t>
-            </a:r>
-          </a:p>
-          <a:p>
-            <a:pPr marL="0" indent="0">
+              <a:t>Provide functionality for predefined and custom expense categories, allowing users to efficiently classify their spending. </a:t>
+            </a:r>
+          </a:p>
+          <a:p>
+            <a:pPr marL="0" indent="0" algn="just">
               <a:buNone/>
             </a:pPr>
             <a:r>
@@ -6135,7 +6131,7 @@
             </a:r>
           </a:p>
           <a:p>
-            <a:pPr marL="0" indent="0">
+            <a:pPr marL="0" indent="0" algn="just">
               <a:buNone/>
             </a:pPr>
             <a:r>
@@ -6147,63 +6143,53 @@
             </a:r>
           </a:p>
           <a:p>
-            <a:pPr marL="0" indent="0">
-              <a:buNone/>
-            </a:pPr>
+            <a:pPr algn="just"/>
             <a:r>
               <a:rPr lang="en-US" sz="1500" dirty="0">
                 <a:latin typeface="Times New Roman" panose="02020603050405020304" pitchFamily="18" charset="0"/>
                 <a:cs typeface="Times New Roman" panose="02020603050405020304" pitchFamily="18" charset="0"/>
               </a:rPr>
-              <a:t> • Enhanced Financial Awareness </a:t>
-            </a:r>
-          </a:p>
-          <a:p>
-            <a:pPr marL="0" indent="0">
-              <a:buNone/>
-            </a:pPr>
+              <a:t>Enhanced Financial Awareness </a:t>
+            </a:r>
+          </a:p>
+          <a:p>
+            <a:pPr algn="just"/>
             <a:r>
               <a:rPr lang="en-US" sz="1500" dirty="0">
                 <a:latin typeface="Times New Roman" panose="02020603050405020304" pitchFamily="18" charset="0"/>
                 <a:cs typeface="Times New Roman" panose="02020603050405020304" pitchFamily="18" charset="0"/>
               </a:rPr>
-              <a:t>• Improved Budget Adherence </a:t>
-            </a:r>
-          </a:p>
-          <a:p>
-            <a:pPr marL="0" indent="0">
-              <a:buNone/>
-            </a:pPr>
+              <a:t>Improved Budget Adherence </a:t>
+            </a:r>
+          </a:p>
+          <a:p>
+            <a:pPr algn="just"/>
             <a:r>
               <a:rPr lang="en-US" sz="1500" dirty="0">
                 <a:latin typeface="Times New Roman" panose="02020603050405020304" pitchFamily="18" charset="0"/>
                 <a:cs typeface="Times New Roman" panose="02020603050405020304" pitchFamily="18" charset="0"/>
               </a:rPr>
-              <a:t>• Increased Savings Potential </a:t>
-            </a:r>
-          </a:p>
-          <a:p>
-            <a:pPr marL="0" indent="0">
-              <a:buNone/>
-            </a:pPr>
+              <a:t>Increased Savings Potential </a:t>
+            </a:r>
+          </a:p>
+          <a:p>
+            <a:pPr algn="just"/>
             <a:r>
               <a:rPr lang="en-US" sz="1500" dirty="0">
                 <a:latin typeface="Times New Roman" panose="02020603050405020304" pitchFamily="18" charset="0"/>
                 <a:cs typeface="Times New Roman" panose="02020603050405020304" pitchFamily="18" charset="0"/>
               </a:rPr>
-              <a:t>• Reduced Financial Stress</a:t>
-            </a:r>
-          </a:p>
-          <a:p>
-            <a:pPr marL="0" indent="0">
-              <a:buNone/>
-            </a:pPr>
+              <a:t>Reduced Financial Stress</a:t>
+            </a:r>
+          </a:p>
+          <a:p>
+            <a:pPr algn="just"/>
             <a:r>
               <a:rPr lang="en-US" sz="1500" dirty="0">
                 <a:latin typeface="Times New Roman" panose="02020603050405020304" pitchFamily="18" charset="0"/>
                 <a:cs typeface="Times New Roman" panose="02020603050405020304" pitchFamily="18" charset="0"/>
               </a:rPr>
-              <a:t> • Simplicity and Accessibility </a:t>
+              <a:t>Simplicity and Accessibility </a:t>
             </a:r>
             <a:endParaRPr sz="1500" dirty="0">
               <a:latin typeface="Times New Roman" panose="02020603050405020304" pitchFamily="18" charset="0"/>
@@ -6304,7 +6290,7 @@
                 <a:latin typeface="Times New Roman" panose="02020603050405020304" pitchFamily="18" charset="0"/>
                 <a:cs typeface="Times New Roman" panose="02020603050405020304" pitchFamily="18" charset="0"/>
               </a:rPr>
-              <a:t> To ensure real-time synchronization between frontend and backend.</a:t>
+              <a:t>To ensure real-time synchronization between frontend and backend.</a:t>
             </a:r>
             <a:endParaRPr lang="en-US" sz="1800" dirty="0">
               <a:latin typeface="Times New Roman" panose="02020603050405020304" pitchFamily="18" charset="0"/>
@@ -6318,7 +6304,7 @@
                 <a:latin typeface="Times New Roman" panose="02020603050405020304" pitchFamily="18" charset="0"/>
                 <a:cs typeface="Times New Roman" panose="02020603050405020304" pitchFamily="18" charset="0"/>
               </a:rPr>
-              <a:t> To enable data storage, retrieval, and analytics seamlessly.</a:t>
+              <a:t>To enable data storage, retrieval, and analytics seamlessly.</a:t>
             </a:r>
             <a:endParaRPr lang="en-US" sz="1800" dirty="0">
               <a:latin typeface="Times New Roman" panose="02020603050405020304" pitchFamily="18" charset="0"/>
@@ -6332,7 +6318,7 @@
                 <a:latin typeface="Times New Roman" panose="02020603050405020304" pitchFamily="18" charset="0"/>
                 <a:cs typeface="Times New Roman" panose="02020603050405020304" pitchFamily="18" charset="0"/>
               </a:rPr>
-              <a:t> To enhance financial awareness and encourage better budgeting habits among users.</a:t>
+              <a:t>To enhance financial awareness and encourage better budgeting habits among users.</a:t>
             </a:r>
           </a:p>
         </p:txBody>
@@ -6439,51 +6425,43 @@
             </a:r>
           </a:p>
           <a:p>
-            <a:pPr marL="0" indent="0" algn="just">
-              <a:buNone/>
-            </a:pPr>
+            <a:pPr algn="just"/>
             <a:r>
               <a:rPr lang="en-US" sz="1500" dirty="0">
                 <a:latin typeface="Times New Roman" panose="02020603050405020304" pitchFamily="18" charset="0"/>
                 <a:cs typeface="Times New Roman" panose="02020603050405020304" pitchFamily="18" charset="0"/>
               </a:rPr>
-              <a:t> • Identify unnecessary spending areas. </a:t>
-            </a:r>
-          </a:p>
-          <a:p>
-            <a:pPr marL="0" indent="0" algn="just">
-              <a:buNone/>
-            </a:pPr>
+              <a:t>Identify unnecessary spending areas. </a:t>
+            </a:r>
+          </a:p>
+          <a:p>
+            <a:pPr algn="just"/>
             <a:r>
               <a:rPr lang="en-US" sz="1500" dirty="0">
                 <a:latin typeface="Times New Roman" panose="02020603050405020304" pitchFamily="18" charset="0"/>
                 <a:cs typeface="Times New Roman" panose="02020603050405020304" pitchFamily="18" charset="0"/>
               </a:rPr>
-              <a:t>• Follow the declared budgets. </a:t>
-            </a:r>
-          </a:p>
-          <a:p>
-            <a:pPr marL="0" indent="0" algn="just">
-              <a:buNone/>
-            </a:pPr>
+              <a:t>Follow the declared budgets. </a:t>
+            </a:r>
+          </a:p>
+          <a:p>
+            <a:pPr algn="just"/>
             <a:r>
               <a:rPr lang="en-US" sz="1500" dirty="0">
                 <a:latin typeface="Times New Roman" panose="02020603050405020304" pitchFamily="18" charset="0"/>
                 <a:cs typeface="Times New Roman" panose="02020603050405020304" pitchFamily="18" charset="0"/>
               </a:rPr>
-              <a:t>• Collect savings for future goals (e.g., higher education, home purchase, emergency fund). </a:t>
-            </a:r>
-          </a:p>
-          <a:p>
-            <a:pPr marL="0" indent="0" algn="just">
-              <a:buNone/>
-            </a:pPr>
+              <a:t>Collect savings for future goals (e.g., higher education, home purchase, emergency fund). </a:t>
+            </a:r>
+          </a:p>
+          <a:p>
+            <a:pPr algn="just"/>
             <a:r>
               <a:rPr lang="en-US" sz="1500" dirty="0">
                 <a:latin typeface="Times New Roman" panose="02020603050405020304" pitchFamily="18" charset="0"/>
                 <a:cs typeface="Times New Roman" panose="02020603050405020304" pitchFamily="18" charset="0"/>
               </a:rPr>
-              <a:t>• Understand the impact of small, seemingly unused expenditures. </a:t>
+              <a:t>Understand the impact of small, seemingly unused expenditures. </a:t>
             </a:r>
           </a:p>
           <a:p>

</xml_diff>